<commit_message>
Updated paper with Srikanth.
</commit_message>
<xml_diff>
--- a/RA-L Hetro Sensors/pictures/AutoPenetrationAngle.pptx
+++ b/RA-L Hetro Sensors/pictures/AutoPenetrationAngle.pptx
@@ -104,6 +104,11 @@
       </a:defRPr>
     </a:lvl9pPr>
   </p:defaultTextStyle>
+  <p:extLst>
+    <p:ext uri="{EFAFB233-063F-42B5-8137-9DF3F51BA10A}">
+      <p15:sldGuideLst xmlns:p15="http://schemas.microsoft.com/office/powerpoint/2012/main"/>
+    </p:ext>
+  </p:extLst>
 </p:presentation>
 </file>
 
@@ -238,7 +243,7 @@
           <a:p>
             <a:fld id="{2BBD1645-FC76-43C1-A572-DBB15ADD6331}" type="datetimeFigureOut">
               <a:rPr lang="en-US" smtClean="0"/>
-              <a:t>12/5/2016</a:t>
+              <a:t>12/6/2016</a:t>
             </a:fld>
             <a:endParaRPr lang="en-US"/>
           </a:p>
@@ -408,7 +413,7 @@
           <a:p>
             <a:fld id="{2BBD1645-FC76-43C1-A572-DBB15ADD6331}" type="datetimeFigureOut">
               <a:rPr lang="en-US" smtClean="0"/>
-              <a:t>12/5/2016</a:t>
+              <a:t>12/6/2016</a:t>
             </a:fld>
             <a:endParaRPr lang="en-US"/>
           </a:p>
@@ -588,7 +593,7 @@
           <a:p>
             <a:fld id="{2BBD1645-FC76-43C1-A572-DBB15ADD6331}" type="datetimeFigureOut">
               <a:rPr lang="en-US" smtClean="0"/>
-              <a:t>12/5/2016</a:t>
+              <a:t>12/6/2016</a:t>
             </a:fld>
             <a:endParaRPr lang="en-US"/>
           </a:p>
@@ -758,7 +763,7 @@
           <a:p>
             <a:fld id="{2BBD1645-FC76-43C1-A572-DBB15ADD6331}" type="datetimeFigureOut">
               <a:rPr lang="en-US" smtClean="0"/>
-              <a:t>12/5/2016</a:t>
+              <a:t>12/6/2016</a:t>
             </a:fld>
             <a:endParaRPr lang="en-US"/>
           </a:p>
@@ -1004,7 +1009,7 @@
           <a:p>
             <a:fld id="{2BBD1645-FC76-43C1-A572-DBB15ADD6331}" type="datetimeFigureOut">
               <a:rPr lang="en-US" smtClean="0"/>
-              <a:t>12/5/2016</a:t>
+              <a:t>12/6/2016</a:t>
             </a:fld>
             <a:endParaRPr lang="en-US"/>
           </a:p>
@@ -1236,7 +1241,7 @@
           <a:p>
             <a:fld id="{2BBD1645-FC76-43C1-A572-DBB15ADD6331}" type="datetimeFigureOut">
               <a:rPr lang="en-US" smtClean="0"/>
-              <a:t>12/5/2016</a:t>
+              <a:t>12/6/2016</a:t>
             </a:fld>
             <a:endParaRPr lang="en-US"/>
           </a:p>
@@ -1603,7 +1608,7 @@
           <a:p>
             <a:fld id="{2BBD1645-FC76-43C1-A572-DBB15ADD6331}" type="datetimeFigureOut">
               <a:rPr lang="en-US" smtClean="0"/>
-              <a:t>12/5/2016</a:t>
+              <a:t>12/6/2016</a:t>
             </a:fld>
             <a:endParaRPr lang="en-US"/>
           </a:p>
@@ -1721,7 +1726,7 @@
           <a:p>
             <a:fld id="{2BBD1645-FC76-43C1-A572-DBB15ADD6331}" type="datetimeFigureOut">
               <a:rPr lang="en-US" smtClean="0"/>
-              <a:t>12/5/2016</a:t>
+              <a:t>12/6/2016</a:t>
             </a:fld>
             <a:endParaRPr lang="en-US"/>
           </a:p>
@@ -1816,7 +1821,7 @@
           <a:p>
             <a:fld id="{2BBD1645-FC76-43C1-A572-DBB15ADD6331}" type="datetimeFigureOut">
               <a:rPr lang="en-US" smtClean="0"/>
-              <a:t>12/5/2016</a:t>
+              <a:t>12/6/2016</a:t>
             </a:fld>
             <a:endParaRPr lang="en-US"/>
           </a:p>
@@ -2093,7 +2098,7 @@
           <a:p>
             <a:fld id="{2BBD1645-FC76-43C1-A572-DBB15ADD6331}" type="datetimeFigureOut">
               <a:rPr lang="en-US" smtClean="0"/>
-              <a:t>12/5/2016</a:t>
+              <a:t>12/6/2016</a:t>
             </a:fld>
             <a:endParaRPr lang="en-US"/>
           </a:p>
@@ -2350,7 +2355,7 @@
           <a:p>
             <a:fld id="{2BBD1645-FC76-43C1-A572-DBB15ADD6331}" type="datetimeFigureOut">
               <a:rPr lang="en-US" smtClean="0"/>
-              <a:t>12/5/2016</a:t>
+              <a:t>12/6/2016</a:t>
             </a:fld>
             <a:endParaRPr lang="en-US"/>
           </a:p>
@@ -2563,7 +2568,7 @@
           <a:p>
             <a:fld id="{2BBD1645-FC76-43C1-A572-DBB15ADD6331}" type="datetimeFigureOut">
               <a:rPr lang="en-US" smtClean="0"/>
-              <a:t>12/5/2016</a:t>
+              <a:t>12/6/2016</a:t>
             </a:fld>
             <a:endParaRPr lang="en-US"/>
           </a:p>
@@ -2970,7 +2975,7 @@
       </p:grpSpPr>
       <p:pic>
         <p:nvPicPr>
-          <p:cNvPr id="9" name="Picture 8"/>
+          <p:cNvPr id="2" name="Picture 1"/>
           <p:cNvPicPr>
             <a:picLocks noChangeAspect="1"/>
           </p:cNvPicPr>
@@ -2984,13 +2989,13 @@
               </a:ext>
             </a:extLst>
           </a:blip>
-          <a:srcRect l="8795" t="6516" r="8642"/>
+          <a:srcRect l="8157" t="6064" r="9139"/>
           <a:stretch/>
         </p:blipFill>
         <p:spPr>
           <a:xfrm>
-            <a:off x="-6523" y="138022"/>
-            <a:ext cx="12168361" cy="6305910"/>
+            <a:off x="0" y="129397"/>
+            <a:ext cx="12161838" cy="6323968"/>
           </a:xfrm>
           <a:prstGeom prst="rect">
             <a:avLst/>

</xml_diff>